<commit_message>
Revised Sessions 24 and 25 Area Data IV
</commit_message>
<xml_diff>
--- a/00. Introductory Session/Powerpoint Files/Course Intro.pptx
+++ b/00. Introductory Session/Powerpoint Files/Course Intro.pptx
@@ -155,10 +155,6 @@
 </p:presentation>
 </file>
 
-<file path=ppt/revisionInfo.xml><?xml version="1.0" encoding="utf-8"?>
-<p1510:revInfo xmlns:a="http://schemas.openxmlformats.org/drawingml/2006/main" xmlns:r="http://schemas.openxmlformats.org/officeDocument/2006/relationships" xmlns:p1510="http://schemas.microsoft.com/office/powerpoint/2015/10/main"/>
-</file>
-
 <file path=ppt/notesMasters/notesMaster1.xml><?xml version="1.0" encoding="utf-8"?>
 <p:notesMaster xmlns:a="http://schemas.openxmlformats.org/drawingml/2006/main" xmlns:r="http://schemas.openxmlformats.org/officeDocument/2006/relationships" xmlns:p="http://schemas.openxmlformats.org/presentationml/2006/main">
   <p:cSld>
@@ -241,7 +237,7 @@
           <a:p>
             <a:fld id="{AEE47635-74EB-4A1B-91D2-74849F638503}" type="datetimeFigureOut">
               <a:rPr lang="en-CA" smtClean="0"/>
-              <a:t>2018-01-08</a:t>
+              <a:t>2019-01-11</a:t>
             </a:fld>
             <a:endParaRPr lang="en-CA"/>
           </a:p>
@@ -5929,29 +5925,6 @@
           </a:p>
         </p:txBody>
       </p:sp>
-      <p:pic>
-        <p:nvPicPr>
-          <p:cNvPr id="4" name="Picture 3"/>
-          <p:cNvPicPr>
-            <a:picLocks noChangeAspect="1"/>
-          </p:cNvPicPr>
-          <p:nvPr/>
-        </p:nvPicPr>
-        <p:blipFill rotWithShape="1">
-          <a:blip r:embed="rId2"/>
-          <a:srcRect l="51667" t="34000" r="23333" b="31334"/>
-          <a:stretch/>
-        </p:blipFill>
-        <p:spPr>
-          <a:xfrm>
-            <a:off x="1733061" y="1592385"/>
-            <a:ext cx="8616462" cy="3733800"/>
-          </a:xfrm>
-          <a:prstGeom prst="rect">
-            <a:avLst/>
-          </a:prstGeom>
-        </p:spPr>
-      </p:pic>
     </p:spTree>
     <p:extLst>
       <p:ext uri="{BB962C8B-B14F-4D97-AF65-F5344CB8AC3E}">
@@ -6126,29 +6099,6 @@
           </a:p>
         </p:txBody>
       </p:sp>
-      <p:pic>
-        <p:nvPicPr>
-          <p:cNvPr id="4" name="Content Placeholder 4"/>
-          <p:cNvPicPr>
-            <a:picLocks noChangeAspect="1"/>
-          </p:cNvPicPr>
-          <p:nvPr/>
-        </p:nvPicPr>
-        <p:blipFill rotWithShape="1">
-          <a:blip r:embed="rId2"/>
-          <a:srcRect l="1775" t="42337" r="78704" b="28457"/>
-          <a:stretch/>
-        </p:blipFill>
-        <p:spPr>
-          <a:xfrm>
-            <a:off x="1671678" y="1825625"/>
-            <a:ext cx="8972876" cy="4195111"/>
-          </a:xfrm>
-          <a:prstGeom prst="rect">
-            <a:avLst/>
-          </a:prstGeom>
-        </p:spPr>
-      </p:pic>
     </p:spTree>
     <p:extLst>
       <p:ext uri="{BB962C8B-B14F-4D97-AF65-F5344CB8AC3E}">

</xml_diff>